<commit_message>
setup windows web server
</commit_message>
<xml_diff>
--- a/document/01_develop_webdb_on_iaas/図版.pptx
+++ b/document/01_develop_webdb_on_iaas/図版.pptx
@@ -12,6 +12,9 @@
     <p:sldId id="260" r:id="rId6"/>
     <p:sldId id="261" r:id="rId7"/>
     <p:sldId id="262" r:id="rId8"/>
+    <p:sldId id="263" r:id="rId9"/>
+    <p:sldId id="264" r:id="rId10"/>
+    <p:sldId id="265" r:id="rId11"/>
   </p:sldIdLst>
   <p:sldSz cx="12192000" cy="6858000"/>
   <p:notesSz cx="6858000" cy="9144000"/>
@@ -4052,6 +4055,274 @@
 </p:sld>
 </file>
 
+<file path=ppt/slides/slide10.xml><?xml version="1.0" encoding="utf-8"?>
+<p:sld xmlns:a="http://schemas.openxmlformats.org/drawingml/2006/main" xmlns:r="http://schemas.openxmlformats.org/officeDocument/2006/relationships" xmlns:p="http://schemas.openxmlformats.org/presentationml/2006/main">
+  <p:cSld>
+    <p:spTree>
+      <p:nvGrpSpPr>
+        <p:cNvPr id="1" name=""/>
+        <p:cNvGrpSpPr/>
+        <p:nvPr/>
+      </p:nvGrpSpPr>
+      <p:grpSpPr>
+        <a:xfrm>
+          <a:off x="0" y="0"/>
+          <a:ext cx="0" cy="0"/>
+          <a:chOff x="0" y="0"/>
+          <a:chExt cx="0" cy="0"/>
+        </a:xfrm>
+      </p:grpSpPr>
+      <p:pic>
+        <p:nvPicPr>
+          <p:cNvPr id="5" name="図 4">
+            <a:extLst>
+              <a:ext uri="{FF2B5EF4-FFF2-40B4-BE49-F238E27FC236}">
+                <a16:creationId xmlns:a16="http://schemas.microsoft.com/office/drawing/2014/main" id="{1AD8778F-1811-4D2B-AC28-04A2929896AA}"/>
+              </a:ext>
+            </a:extLst>
+          </p:cNvPr>
+          <p:cNvPicPr>
+            <a:picLocks noChangeAspect="1"/>
+          </p:cNvPicPr>
+          <p:nvPr/>
+        </p:nvPicPr>
+        <p:blipFill>
+          <a:blip r:embed="rId2"/>
+          <a:stretch>
+            <a:fillRect/>
+          </a:stretch>
+        </p:blipFill>
+        <p:spPr>
+          <a:xfrm>
+            <a:off x="218194" y="332614"/>
+            <a:ext cx="9912955" cy="2859272"/>
+          </a:xfrm>
+          <a:prstGeom prst="rect">
+            <a:avLst/>
+          </a:prstGeom>
+          <a:ln>
+            <a:noFill/>
+          </a:ln>
+          <a:effectLst>
+            <a:outerShdw blurRad="292100" dist="139700" dir="2700000" algn="tl" rotWithShape="0">
+              <a:srgbClr val="333333">
+                <a:alpha val="65000"/>
+              </a:srgbClr>
+            </a:outerShdw>
+          </a:effectLst>
+        </p:spPr>
+      </p:pic>
+      <p:sp>
+        <p:nvSpPr>
+          <p:cNvPr id="6" name="四角形: 角を丸くする 5">
+            <a:extLst>
+              <a:ext uri="{FF2B5EF4-FFF2-40B4-BE49-F238E27FC236}">
+                <a16:creationId xmlns:a16="http://schemas.microsoft.com/office/drawing/2014/main" id="{A3D7C9E9-31A8-4F17-AD6C-18CE9739F6E6}"/>
+              </a:ext>
+            </a:extLst>
+          </p:cNvPr>
+          <p:cNvSpPr/>
+          <p:nvPr/>
+        </p:nvSpPr>
+        <p:spPr>
+          <a:xfrm>
+            <a:off x="6908690" y="2037473"/>
+            <a:ext cx="2768710" cy="488979"/>
+          </a:xfrm>
+          <a:prstGeom prst="roundRect">
+            <a:avLst>
+              <a:gd name="adj" fmla="val 9175"/>
+            </a:avLst>
+          </a:prstGeom>
+          <a:noFill/>
+          <a:ln w="38100">
+            <a:solidFill>
+              <a:srgbClr val="FF0000"/>
+            </a:solidFill>
+          </a:ln>
+        </p:spPr>
+        <p:style>
+          <a:lnRef idx="2">
+            <a:schemeClr val="accent1">
+              <a:shade val="50000"/>
+            </a:schemeClr>
+          </a:lnRef>
+          <a:fillRef idx="1">
+            <a:schemeClr val="accent1"/>
+          </a:fillRef>
+          <a:effectRef idx="0">
+            <a:schemeClr val="accent1"/>
+          </a:effectRef>
+          <a:fontRef idx="minor">
+            <a:schemeClr val="lt1"/>
+          </a:fontRef>
+        </p:style>
+        <p:txBody>
+          <a:bodyPr rot="0" spcFirstLastPara="0" vertOverflow="overflow" horzOverflow="overflow" vert="horz" wrap="square" lIns="91440" tIns="45720" rIns="91440" bIns="45720" numCol="1" spcCol="0" rtlCol="0" fromWordArt="0" anchor="ctr" anchorCtr="0" forceAA="0" compatLnSpc="1">
+            <a:prstTxWarp prst="textNoShape">
+              <a:avLst/>
+            </a:prstTxWarp>
+            <a:noAutofit/>
+          </a:bodyPr>
+          <a:lstStyle/>
+          <a:p>
+            <a:pPr algn="ctr"/>
+            <a:endParaRPr lang="ja-JP" altLang="en-US"/>
+          </a:p>
+        </p:txBody>
+      </p:sp>
+      <p:pic>
+        <p:nvPicPr>
+          <p:cNvPr id="8" name="図 7">
+            <a:extLst>
+              <a:ext uri="{FF2B5EF4-FFF2-40B4-BE49-F238E27FC236}">
+                <a16:creationId xmlns:a16="http://schemas.microsoft.com/office/drawing/2014/main" id="{8427E918-9E47-4572-9B15-C346D0D5341A}"/>
+              </a:ext>
+            </a:extLst>
+          </p:cNvPr>
+          <p:cNvPicPr>
+            <a:picLocks noChangeAspect="1"/>
+          </p:cNvPicPr>
+          <p:nvPr/>
+        </p:nvPicPr>
+        <p:blipFill>
+          <a:blip r:embed="rId3"/>
+          <a:stretch>
+            <a:fillRect/>
+          </a:stretch>
+        </p:blipFill>
+        <p:spPr>
+          <a:xfrm>
+            <a:off x="218194" y="3748366"/>
+            <a:ext cx="4311067" cy="3030455"/>
+          </a:xfrm>
+          <a:prstGeom prst="rect">
+            <a:avLst/>
+          </a:prstGeom>
+          <a:ln>
+            <a:noFill/>
+          </a:ln>
+          <a:effectLst>
+            <a:outerShdw blurRad="292100" dist="139700" dir="2700000" algn="tl" rotWithShape="0">
+              <a:srgbClr val="333333">
+                <a:alpha val="65000"/>
+              </a:srgbClr>
+            </a:outerShdw>
+          </a:effectLst>
+        </p:spPr>
+      </p:pic>
+      <p:sp>
+        <p:nvSpPr>
+          <p:cNvPr id="9" name="四角形: 角を丸くする 8">
+            <a:extLst>
+              <a:ext uri="{FF2B5EF4-FFF2-40B4-BE49-F238E27FC236}">
+                <a16:creationId xmlns:a16="http://schemas.microsoft.com/office/drawing/2014/main" id="{CC0AF071-0B58-4B5B-A7CB-284FDFBCD3F0}"/>
+              </a:ext>
+            </a:extLst>
+          </p:cNvPr>
+          <p:cNvSpPr/>
+          <p:nvPr/>
+        </p:nvSpPr>
+        <p:spPr>
+          <a:xfrm>
+            <a:off x="1227159" y="4955921"/>
+            <a:ext cx="2517009" cy="488979"/>
+          </a:xfrm>
+          <a:prstGeom prst="roundRect">
+            <a:avLst>
+              <a:gd name="adj" fmla="val 9175"/>
+            </a:avLst>
+          </a:prstGeom>
+          <a:noFill/>
+          <a:ln w="38100">
+            <a:solidFill>
+              <a:srgbClr val="FF0000"/>
+            </a:solidFill>
+          </a:ln>
+        </p:spPr>
+        <p:style>
+          <a:lnRef idx="2">
+            <a:schemeClr val="accent1">
+              <a:shade val="50000"/>
+            </a:schemeClr>
+          </a:lnRef>
+          <a:fillRef idx="1">
+            <a:schemeClr val="accent1"/>
+          </a:fillRef>
+          <a:effectRef idx="0">
+            <a:schemeClr val="accent1"/>
+          </a:effectRef>
+          <a:fontRef idx="minor">
+            <a:schemeClr val="lt1"/>
+          </a:fontRef>
+        </p:style>
+        <p:txBody>
+          <a:bodyPr rot="0" spcFirstLastPara="0" vertOverflow="overflow" horzOverflow="overflow" vert="horz" wrap="square" lIns="91440" tIns="45720" rIns="91440" bIns="45720" numCol="1" spcCol="0" rtlCol="0" fromWordArt="0" anchor="ctr" anchorCtr="0" forceAA="0" compatLnSpc="1">
+            <a:prstTxWarp prst="textNoShape">
+              <a:avLst/>
+            </a:prstTxWarp>
+            <a:noAutofit/>
+          </a:bodyPr>
+          <a:lstStyle/>
+          <a:p>
+            <a:pPr algn="ctr"/>
+            <a:endParaRPr lang="ja-JP" altLang="en-US"/>
+          </a:p>
+        </p:txBody>
+      </p:sp>
+      <p:pic>
+        <p:nvPicPr>
+          <p:cNvPr id="10" name="図 9">
+            <a:extLst>
+              <a:ext uri="{FF2B5EF4-FFF2-40B4-BE49-F238E27FC236}">
+                <a16:creationId xmlns:a16="http://schemas.microsoft.com/office/drawing/2014/main" id="{248A9704-372F-4282-94DC-52B4F4EC5805}"/>
+              </a:ext>
+            </a:extLst>
+          </p:cNvPr>
+          <p:cNvPicPr>
+            <a:picLocks noChangeAspect="1"/>
+          </p:cNvPicPr>
+          <p:nvPr/>
+        </p:nvPicPr>
+        <p:blipFill>
+          <a:blip r:embed="rId4"/>
+          <a:stretch>
+            <a:fillRect/>
+          </a:stretch>
+        </p:blipFill>
+        <p:spPr>
+          <a:xfrm>
+            <a:off x="4839248" y="3809363"/>
+            <a:ext cx="3453797" cy="2908460"/>
+          </a:xfrm>
+          <a:prstGeom prst="rect">
+            <a:avLst/>
+          </a:prstGeom>
+          <a:ln>
+            <a:noFill/>
+          </a:ln>
+          <a:effectLst>
+            <a:outerShdw blurRad="292100" dist="139700" dir="2700000" algn="tl" rotWithShape="0">
+              <a:srgbClr val="333333">
+                <a:alpha val="65000"/>
+              </a:srgbClr>
+            </a:outerShdw>
+          </a:effectLst>
+        </p:spPr>
+      </p:pic>
+    </p:spTree>
+    <p:extLst>
+      <p:ext uri="{BB962C8B-B14F-4D97-AF65-F5344CB8AC3E}">
+        <p14:creationId xmlns:p14="http://schemas.microsoft.com/office/powerpoint/2010/main" val="3061003617"/>
+      </p:ext>
+    </p:extLst>
+  </p:cSld>
+  <p:clrMapOvr>
+    <a:masterClrMapping/>
+  </p:clrMapOvr>
+</p:sld>
+</file>
+
 <file path=ppt/slides/slide2.xml><?xml version="1.0" encoding="utf-8"?>
 <p:sld xmlns:a="http://schemas.openxmlformats.org/drawingml/2006/main" xmlns:r="http://schemas.openxmlformats.org/officeDocument/2006/relationships" xmlns:p="http://schemas.openxmlformats.org/presentationml/2006/main">
   <p:cSld>
@@ -6709,6 +6980,276 @@
     <p:extLst>
       <p:ext uri="{BB962C8B-B14F-4D97-AF65-F5344CB8AC3E}">
         <p14:creationId xmlns:p14="http://schemas.microsoft.com/office/powerpoint/2010/main" val="4191470101"/>
+      </p:ext>
+    </p:extLst>
+  </p:cSld>
+  <p:clrMapOvr>
+    <a:masterClrMapping/>
+  </p:clrMapOvr>
+</p:sld>
+</file>
+
+<file path=ppt/slides/slide8.xml><?xml version="1.0" encoding="utf-8"?>
+<p:sld xmlns:a="http://schemas.openxmlformats.org/drawingml/2006/main" xmlns:r="http://schemas.openxmlformats.org/officeDocument/2006/relationships" xmlns:p="http://schemas.openxmlformats.org/presentationml/2006/main">
+  <p:cSld>
+    <p:spTree>
+      <p:nvGrpSpPr>
+        <p:cNvPr id="1" name=""/>
+        <p:cNvGrpSpPr/>
+        <p:nvPr/>
+      </p:nvGrpSpPr>
+      <p:grpSpPr>
+        <a:xfrm>
+          <a:off x="0" y="0"/>
+          <a:ext cx="0" cy="0"/>
+          <a:chOff x="0" y="0"/>
+          <a:chExt cx="0" cy="0"/>
+        </a:xfrm>
+      </p:grpSpPr>
+      <p:pic>
+        <p:nvPicPr>
+          <p:cNvPr id="3" name="図 2">
+            <a:extLst>
+              <a:ext uri="{FF2B5EF4-FFF2-40B4-BE49-F238E27FC236}">
+                <a16:creationId xmlns:a16="http://schemas.microsoft.com/office/drawing/2014/main" id="{BB64A93A-BBA6-4802-84A2-5E8FC5B230EE}"/>
+              </a:ext>
+            </a:extLst>
+          </p:cNvPr>
+          <p:cNvPicPr>
+            <a:picLocks noChangeAspect="1"/>
+          </p:cNvPicPr>
+          <p:nvPr/>
+        </p:nvPicPr>
+        <p:blipFill>
+          <a:blip r:embed="rId2">
+            <a:extLst>
+              <a:ext uri="{28A0092B-C50C-407E-A947-70E740481C1C}">
+                <a14:useLocalDpi xmlns:a14="http://schemas.microsoft.com/office/drawing/2010/main" val="0"/>
+              </a:ext>
+            </a:extLst>
+          </a:blip>
+          <a:stretch>
+            <a:fillRect/>
+          </a:stretch>
+        </p:blipFill>
+        <p:spPr>
+          <a:xfrm>
+            <a:off x="530978" y="500041"/>
+            <a:ext cx="11130044" cy="5857918"/>
+          </a:xfrm>
+          <a:prstGeom prst="rect">
+            <a:avLst/>
+          </a:prstGeom>
+          <a:ln>
+            <a:noFill/>
+          </a:ln>
+          <a:effectLst>
+            <a:outerShdw blurRad="292100" dist="139700" dir="2700000" algn="tl" rotWithShape="0">
+              <a:srgbClr val="333333">
+                <a:alpha val="65000"/>
+              </a:srgbClr>
+            </a:outerShdw>
+          </a:effectLst>
+        </p:spPr>
+      </p:pic>
+      <p:sp>
+        <p:nvSpPr>
+          <p:cNvPr id="4" name="四角形: 角を丸くする 3">
+            <a:extLst>
+              <a:ext uri="{FF2B5EF4-FFF2-40B4-BE49-F238E27FC236}">
+                <a16:creationId xmlns:a16="http://schemas.microsoft.com/office/drawing/2014/main" id="{D71C1B9A-6A5A-4DFD-96E8-F85EEA5DF77E}"/>
+              </a:ext>
+            </a:extLst>
+          </p:cNvPr>
+          <p:cNvSpPr/>
+          <p:nvPr/>
+        </p:nvSpPr>
+        <p:spPr>
+          <a:xfrm>
+            <a:off x="2831291" y="2127004"/>
+            <a:ext cx="8702618" cy="4426195"/>
+          </a:xfrm>
+          <a:prstGeom prst="roundRect">
+            <a:avLst>
+              <a:gd name="adj" fmla="val 5106"/>
+            </a:avLst>
+          </a:prstGeom>
+          <a:noFill/>
+          <a:ln w="38100">
+            <a:solidFill>
+              <a:srgbClr val="FF0000"/>
+            </a:solidFill>
+          </a:ln>
+        </p:spPr>
+        <p:style>
+          <a:lnRef idx="2">
+            <a:schemeClr val="accent1">
+              <a:shade val="50000"/>
+            </a:schemeClr>
+          </a:lnRef>
+          <a:fillRef idx="1">
+            <a:schemeClr val="accent1"/>
+          </a:fillRef>
+          <a:effectRef idx="0">
+            <a:schemeClr val="accent1"/>
+          </a:effectRef>
+          <a:fontRef idx="minor">
+            <a:schemeClr val="lt1"/>
+          </a:fontRef>
+        </p:style>
+        <p:txBody>
+          <a:bodyPr rot="0" spcFirstLastPara="0" vertOverflow="overflow" horzOverflow="overflow" vert="horz" wrap="square" lIns="91440" tIns="45720" rIns="91440" bIns="45720" numCol="1" spcCol="0" rtlCol="0" fromWordArt="0" anchor="ctr" anchorCtr="0" forceAA="0" compatLnSpc="1">
+            <a:prstTxWarp prst="textNoShape">
+              <a:avLst/>
+            </a:prstTxWarp>
+            <a:noAutofit/>
+          </a:bodyPr>
+          <a:lstStyle/>
+          <a:p>
+            <a:pPr algn="ctr"/>
+            <a:endParaRPr lang="ja-JP" altLang="en-US"/>
+          </a:p>
+        </p:txBody>
+      </p:sp>
+    </p:spTree>
+    <p:extLst>
+      <p:ext uri="{BB962C8B-B14F-4D97-AF65-F5344CB8AC3E}">
+        <p14:creationId xmlns:p14="http://schemas.microsoft.com/office/powerpoint/2010/main" val="215170697"/>
+      </p:ext>
+    </p:extLst>
+  </p:cSld>
+  <p:clrMapOvr>
+    <a:masterClrMapping/>
+  </p:clrMapOvr>
+</p:sld>
+</file>
+
+<file path=ppt/slides/slide9.xml><?xml version="1.0" encoding="utf-8"?>
+<p:sld xmlns:a="http://schemas.openxmlformats.org/drawingml/2006/main" xmlns:r="http://schemas.openxmlformats.org/officeDocument/2006/relationships" xmlns:p="http://schemas.openxmlformats.org/presentationml/2006/main">
+  <p:cSld>
+    <p:spTree>
+      <p:nvGrpSpPr>
+        <p:cNvPr id="1" name=""/>
+        <p:cNvGrpSpPr/>
+        <p:nvPr/>
+      </p:nvGrpSpPr>
+      <p:grpSpPr>
+        <a:xfrm>
+          <a:off x="0" y="0"/>
+          <a:ext cx="0" cy="0"/>
+          <a:chOff x="0" y="0"/>
+          <a:chExt cx="0" cy="0"/>
+        </a:xfrm>
+      </p:grpSpPr>
+      <p:pic>
+        <p:nvPicPr>
+          <p:cNvPr id="3" name="図 2" descr="スクリーンショット が含まれている画像&#10;&#10;非常に高い精度で生成された説明">
+            <a:extLst>
+              <a:ext uri="{FF2B5EF4-FFF2-40B4-BE49-F238E27FC236}">
+                <a16:creationId xmlns:a16="http://schemas.microsoft.com/office/drawing/2014/main" id="{BBF16C72-91A5-4C73-A891-D53709460FBA}"/>
+              </a:ext>
+            </a:extLst>
+          </p:cNvPr>
+          <p:cNvPicPr>
+            <a:picLocks noChangeAspect="1"/>
+          </p:cNvPicPr>
+          <p:nvPr/>
+        </p:nvPicPr>
+        <p:blipFill>
+          <a:blip r:embed="rId2">
+            <a:extLst>
+              <a:ext uri="{28A0092B-C50C-407E-A947-70E740481C1C}">
+                <a14:useLocalDpi xmlns:a14="http://schemas.microsoft.com/office/drawing/2010/main" val="0"/>
+              </a:ext>
+            </a:extLst>
+          </a:blip>
+          <a:stretch>
+            <a:fillRect/>
+          </a:stretch>
+        </p:blipFill>
+        <p:spPr>
+          <a:xfrm>
+            <a:off x="514309" y="1821644"/>
+            <a:ext cx="11163382" cy="3214711"/>
+          </a:xfrm>
+          <a:prstGeom prst="rect">
+            <a:avLst/>
+          </a:prstGeom>
+          <a:ln>
+            <a:noFill/>
+          </a:ln>
+          <a:effectLst>
+            <a:outerShdw blurRad="292100" dist="139700" dir="2700000" algn="tl" rotWithShape="0">
+              <a:srgbClr val="333333">
+                <a:alpha val="65000"/>
+              </a:srgbClr>
+            </a:outerShdw>
+          </a:effectLst>
+        </p:spPr>
+      </p:pic>
+      <p:sp>
+        <p:nvSpPr>
+          <p:cNvPr id="4" name="四角形: 角を丸くする 3">
+            <a:extLst>
+              <a:ext uri="{FF2B5EF4-FFF2-40B4-BE49-F238E27FC236}">
+                <a16:creationId xmlns:a16="http://schemas.microsoft.com/office/drawing/2014/main" id="{AD4B773D-E491-4C24-AC98-6F9CEA11F3B1}"/>
+              </a:ext>
+            </a:extLst>
+          </p:cNvPr>
+          <p:cNvSpPr/>
+          <p:nvPr/>
+        </p:nvSpPr>
+        <p:spPr>
+          <a:xfrm>
+            <a:off x="2831291" y="3283412"/>
+            <a:ext cx="8702618" cy="1282112"/>
+          </a:xfrm>
+          <a:prstGeom prst="roundRect">
+            <a:avLst>
+              <a:gd name="adj" fmla="val 5106"/>
+            </a:avLst>
+          </a:prstGeom>
+          <a:noFill/>
+          <a:ln w="38100">
+            <a:solidFill>
+              <a:srgbClr val="FF0000"/>
+            </a:solidFill>
+          </a:ln>
+        </p:spPr>
+        <p:style>
+          <a:lnRef idx="2">
+            <a:schemeClr val="accent1">
+              <a:shade val="50000"/>
+            </a:schemeClr>
+          </a:lnRef>
+          <a:fillRef idx="1">
+            <a:schemeClr val="accent1"/>
+          </a:fillRef>
+          <a:effectRef idx="0">
+            <a:schemeClr val="accent1"/>
+          </a:effectRef>
+          <a:fontRef idx="minor">
+            <a:schemeClr val="lt1"/>
+          </a:fontRef>
+        </p:style>
+        <p:txBody>
+          <a:bodyPr rot="0" spcFirstLastPara="0" vertOverflow="overflow" horzOverflow="overflow" vert="horz" wrap="square" lIns="91440" tIns="45720" rIns="91440" bIns="45720" numCol="1" spcCol="0" rtlCol="0" fromWordArt="0" anchor="ctr" anchorCtr="0" forceAA="0" compatLnSpc="1">
+            <a:prstTxWarp prst="textNoShape">
+              <a:avLst/>
+            </a:prstTxWarp>
+            <a:noAutofit/>
+          </a:bodyPr>
+          <a:lstStyle/>
+          <a:p>
+            <a:pPr algn="ctr"/>
+            <a:endParaRPr lang="ja-JP" altLang="en-US"/>
+          </a:p>
+        </p:txBody>
+      </p:sp>
+    </p:spTree>
+    <p:extLst>
+      <p:ext uri="{BB962C8B-B14F-4D97-AF65-F5344CB8AC3E}">
+        <p14:creationId xmlns:p14="http://schemas.microsoft.com/office/powerpoint/2010/main" val="2159405212"/>
       </p:ext>
     </p:extLst>
   </p:cSld>

</xml_diff>